<commit_message>
update the problem definition
</commit_message>
<xml_diff>
--- a/algorithm design.pptx
+++ b/algorithm design.pptx
@@ -116,7 +116,7 @@
 <file path=ppt/revisionInfo.xml><?xml version="1.0" encoding="utf-8"?>
 <p1510:revInfo xmlns:a="http://schemas.openxmlformats.org/drawingml/2006/main" xmlns:r="http://schemas.openxmlformats.org/officeDocument/2006/relationships" xmlns:p1510="http://schemas.microsoft.com/office/powerpoint/2015/10/main">
   <p1510:revLst>
-    <p1510:client id="{3E04CE2F-7F4E-4A6B-A71D-734C39C46A4B}" v="553" dt="2023-11-05T14:28:32.995"/>
+    <p1510:client id="{3E04CE2F-7F4E-4A6B-A71D-734C39C46A4B}" v="661" dt="2023-11-05T14:45:20.947"/>
   </p1510:revLst>
 </p1510:revInfo>
 </file>
@@ -3164,16 +3164,12 @@
           <a:p>
             <a:pPr marL="457200" indent="-457200"/>
             <a:r>
-              <a:rPr lang="en-US" sz="1800">
+              <a:rPr lang="en-US" sz="1800" dirty="0">
                 <a:latin typeface="Arial Nova"/>
                 <a:cs typeface="Calibri"/>
               </a:rPr>
               <a:t>We need to fill the available schedule slots with those availabilities such that:</a:t>
             </a:r>
-            <a:endParaRPr lang="en-US" sz="1800" dirty="0">
-              <a:latin typeface="Arial Nova"/>
-              <a:cs typeface="Calibri"/>
-            </a:endParaRPr>
           </a:p>
           <a:p>
             <a:pPr marL="914400" lvl="1" indent="-457200">
@@ -3211,6 +3207,18 @@
                 <a:cs typeface="Calibri"/>
               </a:rPr>
               <a:t> if there are multiple valid schedules we want our algorithm to pick the schedule that provide best outcomes in any aspect (academic , cost , …) ,this could be achieved  for example by prioritize the senior professors , prioritize the full time faculties and so on.</a:t>
+            </a:r>
+          </a:p>
+          <a:p>
+            <a:pPr marL="914400" lvl="1" indent="-457200">
+              <a:buAutoNum type="arabicPeriod"/>
+            </a:pPr>
+            <a:r>
+              <a:rPr lang="en-US" sz="1800" dirty="0">
+                <a:latin typeface="Arial Nova"/>
+                <a:cs typeface="Calibri"/>
+              </a:rPr>
+              <a:t>The output schedule should guaranteed that all required courses for one year should be provided and as much as possible of elective courses</a:t>
             </a:r>
           </a:p>
           <a:p>

</xml_diff>

<commit_message>
add slides for output
</commit_message>
<xml_diff>
--- a/algorithm design.pptx
+++ b/algorithm design.pptx
@@ -8,6 +8,7 @@
     <p:sldId id="256" r:id="rId2"/>
     <p:sldId id="257" r:id="rId3"/>
     <p:sldId id="258" r:id="rId4"/>
+    <p:sldId id="259" r:id="rId5"/>
   </p:sldIdLst>
   <p:sldSz cx="12192000" cy="6858000"/>
   <p:notesSz cx="6858000" cy="9144000"/>
@@ -118,7 +119,7 @@
 <p1510:revInfo xmlns:a="http://schemas.openxmlformats.org/drawingml/2006/main" xmlns:r="http://schemas.openxmlformats.org/officeDocument/2006/relationships" xmlns:p1510="http://schemas.microsoft.com/office/powerpoint/2015/10/main">
   <p1510:revLst>
     <p1510:client id="{3E04CE2F-7F4E-4A6B-A71D-734C39C46A4B}" v="661" dt="2023-11-05T14:45:20.947"/>
-    <p1510:client id="{DD752246-19E9-F5D7-3CAE-689A5013460A}" v="131" dt="2023-11-06T04:37:59.157"/>
+    <p1510:client id="{DD752246-19E9-F5D7-3CAE-689A5013460A}" v="299" dt="2023-11-06T04:42:31.170"/>
   </p1510:revLst>
 </p1510:revInfo>
 </file>
@@ -3362,12 +3363,22 @@
           <a:lstStyle/>
           <a:p>
             <a:r>
+              <a:rPr lang="en-US" u="sng" dirty="0">
+                <a:ea typeface="Calibri"/>
+                <a:cs typeface="Calibri"/>
+              </a:rPr>
+              <a:t>Variables:</a:t>
+            </a:r>
+          </a:p>
+          <a:p>
+            <a:r>
               <a:rPr lang="en-US" dirty="0">
                 <a:ea typeface="Calibri"/>
                 <a:cs typeface="Calibri"/>
               </a:rPr>
               <a:t>List of availabilities:  a list that connect between (professor ,course he choose to teach , a time slot on the schedule)</a:t>
             </a:r>
+            <a:endParaRPr lang="en-US"/>
           </a:p>
           <a:p>
             <a:r>
@@ -3379,6 +3390,33 @@
             </a:r>
           </a:p>
           <a:p>
+            <a:r>
+              <a:rPr lang="en-US" u="sng" dirty="0">
+                <a:ea typeface="Calibri" panose="020F0502020204030204"/>
+                <a:cs typeface="Calibri" panose="020F0502020204030204"/>
+              </a:rPr>
+              <a:t>Contants:</a:t>
+            </a:r>
+          </a:p>
+          <a:p>
+            <a:r>
+              <a:rPr lang="en-US" dirty="0">
+                <a:ea typeface="Calibri" panose="020F0502020204030204"/>
+                <a:cs typeface="Calibri" panose="020F0502020204030204"/>
+              </a:rPr>
+              <a:t>List of department professors along with the professor details.</a:t>
+            </a:r>
+          </a:p>
+          <a:p>
+            <a:r>
+              <a:rPr lang="en-US" dirty="0">
+                <a:ea typeface="Calibri" panose="020F0502020204030204"/>
+                <a:cs typeface="Calibri" panose="020F0502020204030204"/>
+              </a:rPr>
+              <a:t>List of courses provided by the department along with the course details.</a:t>
+            </a:r>
+          </a:p>
+          <a:p>
             <a:endParaRPr lang="en-US" dirty="0">
               <a:ea typeface="Calibri" panose="020F0502020204030204"/>
               <a:cs typeface="Calibri" panose="020F0502020204030204"/>
@@ -3390,6 +3428,116 @@
     <p:extLst>
       <p:ext uri="{BB962C8B-B14F-4D97-AF65-F5344CB8AC3E}">
         <p14:creationId xmlns:p14="http://schemas.microsoft.com/office/powerpoint/2010/main" val="3777289671"/>
+      </p:ext>
+    </p:extLst>
+  </p:cSld>
+  <p:clrMapOvr>
+    <a:masterClrMapping/>
+  </p:clrMapOvr>
+</p:sld>
+</file>
+
+<file path=ppt/slides/slide4.xml><?xml version="1.0" encoding="utf-8"?>
+<p:sld xmlns:a="http://schemas.openxmlformats.org/drawingml/2006/main" xmlns:r="http://schemas.openxmlformats.org/officeDocument/2006/relationships" xmlns:p="http://schemas.openxmlformats.org/presentationml/2006/main">
+  <p:cSld>
+    <p:spTree>
+      <p:nvGrpSpPr>
+        <p:cNvPr id="1" name=""/>
+        <p:cNvGrpSpPr/>
+        <p:nvPr/>
+      </p:nvGrpSpPr>
+      <p:grpSpPr>
+        <a:xfrm>
+          <a:off x="0" y="0"/>
+          <a:ext cx="0" cy="0"/>
+          <a:chOff x="0" y="0"/>
+          <a:chExt cx="0" cy="0"/>
+        </a:xfrm>
+      </p:grpSpPr>
+      <p:sp>
+        <p:nvSpPr>
+          <p:cNvPr id="2" name="Title 1">
+            <a:extLst>
+              <a:ext uri="{FF2B5EF4-FFF2-40B4-BE49-F238E27FC236}">
+                <a16:creationId xmlns:a16="http://schemas.microsoft.com/office/drawing/2014/main" id="{7EABA04A-C8EC-4D40-00B5-5D56D86D18FE}"/>
+              </a:ext>
+            </a:extLst>
+          </p:cNvPr>
+          <p:cNvSpPr>
+            <a:spLocks noGrp="1"/>
+          </p:cNvSpPr>
+          <p:nvPr>
+            <p:ph type="title"/>
+          </p:nvPr>
+        </p:nvSpPr>
+        <p:spPr/>
+        <p:txBody>
+          <a:bodyPr/>
+          <a:lstStyle/>
+          <a:p>
+            <a:r>
+              <a:rPr lang="en-US" b="1" dirty="0">
+                <a:ea typeface="Calibri Light"/>
+                <a:cs typeface="Calibri Light"/>
+              </a:rPr>
+              <a:t>Output:</a:t>
+            </a:r>
+            <a:endParaRPr lang="en-US" b="1" dirty="0"/>
+          </a:p>
+        </p:txBody>
+      </p:sp>
+      <p:sp>
+        <p:nvSpPr>
+          <p:cNvPr id="3" name="Content Placeholder 2">
+            <a:extLst>
+              <a:ext uri="{FF2B5EF4-FFF2-40B4-BE49-F238E27FC236}">
+                <a16:creationId xmlns:a16="http://schemas.microsoft.com/office/drawing/2014/main" id="{CE6BE94D-10C7-6537-3358-593A916F403A}"/>
+              </a:ext>
+            </a:extLst>
+          </p:cNvPr>
+          <p:cNvSpPr>
+            <a:spLocks noGrp="1"/>
+          </p:cNvSpPr>
+          <p:nvPr>
+            <p:ph idx="1"/>
+          </p:nvPr>
+        </p:nvSpPr>
+        <p:spPr/>
+        <p:txBody>
+          <a:bodyPr vert="horz" lIns="91440" tIns="45720" rIns="91440" bIns="45720" rtlCol="0" anchor="t">
+            <a:normAutofit/>
+          </a:bodyPr>
+          <a:lstStyle/>
+          <a:p>
+            <a:r>
+              <a:rPr lang="en-US" dirty="0">
+                <a:ea typeface="Calibri"/>
+                <a:cs typeface="Calibri"/>
+              </a:rPr>
+              <a:t>A list of the classes across the week along with the class type and class professors for each major and each year.</a:t>
+            </a:r>
+          </a:p>
+          <a:p>
+            <a:endParaRPr lang="en-US" dirty="0">
+              <a:ea typeface="Calibri"/>
+              <a:cs typeface="Calibri"/>
+            </a:endParaRPr>
+          </a:p>
+          <a:p>
+            <a:r>
+              <a:rPr lang="en-US" dirty="0">
+                <a:ea typeface="Calibri"/>
+                <a:cs typeface="Calibri"/>
+              </a:rPr>
+              <a:t>If there are multiple valid schedule , the algorithm should pick the best option</a:t>
+            </a:r>
+          </a:p>
+        </p:txBody>
+      </p:sp>
+    </p:spTree>
+    <p:extLst>
+      <p:ext uri="{BB962C8B-B14F-4D97-AF65-F5344CB8AC3E}">
+        <p14:creationId xmlns:p14="http://schemas.microsoft.com/office/powerpoint/2010/main" val="379092155"/>
       </p:ext>
     </p:extLst>
   </p:cSld>

</xml_diff>

<commit_message>
add how algorithm work slide
</commit_message>
<xml_diff>
--- a/algorithm design.pptx
+++ b/algorithm design.pptx
@@ -9,6 +9,7 @@
     <p:sldId id="257" r:id="rId3"/>
     <p:sldId id="258" r:id="rId4"/>
     <p:sldId id="259" r:id="rId5"/>
+    <p:sldId id="260" r:id="rId6"/>
   </p:sldIdLst>
   <p:sldSz cx="12192000" cy="6858000"/>
   <p:notesSz cx="6858000" cy="9144000"/>
@@ -119,7 +120,7 @@
 <p1510:revInfo xmlns:a="http://schemas.openxmlformats.org/drawingml/2006/main" xmlns:r="http://schemas.openxmlformats.org/officeDocument/2006/relationships" xmlns:p1510="http://schemas.microsoft.com/office/powerpoint/2015/10/main">
   <p1510:revLst>
     <p1510:client id="{3E04CE2F-7F4E-4A6B-A71D-734C39C46A4B}" v="661" dt="2023-11-05T14:45:20.947"/>
-    <p1510:client id="{DD752246-19E9-F5D7-3CAE-689A5013460A}" v="299" dt="2023-11-06T04:42:31.170"/>
+    <p1510:client id="{DD752246-19E9-F5D7-3CAE-689A5013460A}" v="649" dt="2023-11-06T04:49:13.149"/>
   </p1510:revLst>
 </p1510:revInfo>
 </file>
@@ -3547,6 +3548,204 @@
 </p:sld>
 </file>
 
+<file path=ppt/slides/slide5.xml><?xml version="1.0" encoding="utf-8"?>
+<p:sld xmlns:a="http://schemas.openxmlformats.org/drawingml/2006/main" xmlns:r="http://schemas.openxmlformats.org/officeDocument/2006/relationships" xmlns:p="http://schemas.openxmlformats.org/presentationml/2006/main">
+  <p:cSld>
+    <p:spTree>
+      <p:nvGrpSpPr>
+        <p:cNvPr id="1" name=""/>
+        <p:cNvGrpSpPr/>
+        <p:nvPr/>
+      </p:nvGrpSpPr>
+      <p:grpSpPr>
+        <a:xfrm>
+          <a:off x="0" y="0"/>
+          <a:ext cx="0" cy="0"/>
+          <a:chOff x="0" y="0"/>
+          <a:chExt cx="0" cy="0"/>
+        </a:xfrm>
+      </p:grpSpPr>
+      <p:sp>
+        <p:nvSpPr>
+          <p:cNvPr id="2" name="Title 1">
+            <a:extLst>
+              <a:ext uri="{FF2B5EF4-FFF2-40B4-BE49-F238E27FC236}">
+                <a16:creationId xmlns:a16="http://schemas.microsoft.com/office/drawing/2014/main" id="{955AC40A-8F0D-0B18-3B4E-F01EF2F27343}"/>
+              </a:ext>
+            </a:extLst>
+          </p:cNvPr>
+          <p:cNvSpPr>
+            <a:spLocks noGrp="1"/>
+          </p:cNvSpPr>
+          <p:nvPr>
+            <p:ph type="title"/>
+          </p:nvPr>
+        </p:nvSpPr>
+        <p:spPr/>
+        <p:txBody>
+          <a:bodyPr/>
+          <a:lstStyle/>
+          <a:p>
+            <a:r>
+              <a:rPr lang="en-US" dirty="0">
+                <a:ea typeface="Calibri Light"/>
+                <a:cs typeface="Calibri Light"/>
+              </a:rPr>
+              <a:t>How the algorithm will work:</a:t>
+            </a:r>
+            <a:endParaRPr lang="en-US" dirty="0"/>
+          </a:p>
+        </p:txBody>
+      </p:sp>
+      <p:sp>
+        <p:nvSpPr>
+          <p:cNvPr id="3" name="Content Placeholder 2">
+            <a:extLst>
+              <a:ext uri="{FF2B5EF4-FFF2-40B4-BE49-F238E27FC236}">
+                <a16:creationId xmlns:a16="http://schemas.microsoft.com/office/drawing/2014/main" id="{CA5ABCAE-10BE-ABA4-E664-97E1F85AD72D}"/>
+              </a:ext>
+            </a:extLst>
+          </p:cNvPr>
+          <p:cNvSpPr>
+            <a:spLocks noGrp="1"/>
+          </p:cNvSpPr>
+          <p:nvPr>
+            <p:ph idx="1"/>
+          </p:nvPr>
+        </p:nvSpPr>
+        <p:spPr/>
+        <p:txBody>
+          <a:bodyPr vert="horz" lIns="91440" tIns="45720" rIns="91440" bIns="45720" rtlCol="0" anchor="t">
+            <a:normAutofit/>
+          </a:bodyPr>
+          <a:lstStyle/>
+          <a:p>
+            <a:r>
+              <a:rPr lang="en-US" dirty="0">
+                <a:ea typeface="Calibri"/>
+                <a:cs typeface="Calibri"/>
+              </a:rPr>
+              <a:t>The algorithm will follow a </a:t>
+            </a:r>
+            <a:r>
+              <a:rPr lang="en-US" b="1" dirty="0">
+                <a:ea typeface="Calibri"/>
+                <a:cs typeface="Calibri"/>
+              </a:rPr>
+              <a:t>greedy </a:t>
+            </a:r>
+            <a:r>
+              <a:rPr lang="en-US" dirty="0">
+                <a:ea typeface="Calibri"/>
+                <a:cs typeface="Calibri"/>
+              </a:rPr>
+              <a:t>approach:</a:t>
+            </a:r>
+          </a:p>
+          <a:p>
+            <a:pPr lvl="1"/>
+            <a:r>
+              <a:rPr lang="en-US" dirty="0">
+                <a:ea typeface="Calibri"/>
+                <a:cs typeface="Calibri"/>
+              </a:rPr>
+              <a:t>Start with an empty schedule.</a:t>
+            </a:r>
+          </a:p>
+          <a:p>
+            <a:pPr lvl="1"/>
+            <a:r>
+              <a:rPr lang="en-US" dirty="0">
+                <a:ea typeface="Calibri"/>
+                <a:cs typeface="Calibri"/>
+              </a:rPr>
+              <a:t>Loop the schedule available slot.</a:t>
+            </a:r>
+          </a:p>
+          <a:p>
+            <a:pPr lvl="1"/>
+            <a:r>
+              <a:rPr lang="en-US" dirty="0">
+                <a:ea typeface="Calibri"/>
+                <a:cs typeface="Calibri"/>
+              </a:rPr>
+              <a:t>For each slot pick all the possible availabilities that might fit the slot and not </a:t>
+            </a:r>
+            <a:r>
+              <a:rPr lang="en-US">
+                <a:ea typeface="Calibri"/>
+                <a:cs typeface="Calibri"/>
+              </a:rPr>
+              <a:t>been selected yet.</a:t>
+            </a:r>
+            <a:endParaRPr lang="en-US" dirty="0">
+              <a:ea typeface="Calibri"/>
+              <a:cs typeface="Calibri"/>
+            </a:endParaRPr>
+          </a:p>
+          <a:p>
+            <a:pPr lvl="1"/>
+            <a:r>
+              <a:rPr lang="en-US" dirty="0">
+                <a:ea typeface="Calibri"/>
+                <a:cs typeface="Calibri"/>
+              </a:rPr>
+              <a:t>Sort those availabilities according to priority factors, like prioritize the required courses over elective courses.</a:t>
+            </a:r>
+          </a:p>
+          <a:p>
+            <a:pPr lvl="1"/>
+            <a:r>
+              <a:rPr lang="en-US" dirty="0">
+                <a:ea typeface="Calibri"/>
+                <a:cs typeface="Calibri"/>
+              </a:rPr>
+              <a:t>Loop those availabilities from the beginning and pick what ever availability that does not made a conflict in the professor schedule or year </a:t>
+            </a:r>
+            <a:r>
+              <a:rPr lang="en-US">
+                <a:ea typeface="Calibri"/>
+                <a:cs typeface="Calibri"/>
+              </a:rPr>
+              <a:t>schedule.</a:t>
+            </a:r>
+            <a:endParaRPr lang="en-US" dirty="0">
+              <a:ea typeface="Calibri"/>
+              <a:cs typeface="Calibri"/>
+            </a:endParaRPr>
+          </a:p>
+          <a:p>
+            <a:pPr lvl="1"/>
+            <a:r>
+              <a:rPr lang="en-US" dirty="0">
+                <a:ea typeface="Calibri"/>
+                <a:cs typeface="Calibri"/>
+              </a:rPr>
+              <a:t>Assign this availability to the time slot and mark it as selected</a:t>
+            </a:r>
+          </a:p>
+          <a:p>
+            <a:pPr lvl="1"/>
+            <a:endParaRPr lang="en-US" dirty="0">
+              <a:ea typeface="Calibri"/>
+              <a:cs typeface="Calibri"/>
+            </a:endParaRPr>
+          </a:p>
+        </p:txBody>
+      </p:sp>
+    </p:spTree>
+    <p:extLst>
+      <p:ext uri="{BB962C8B-B14F-4D97-AF65-F5344CB8AC3E}">
+        <p14:creationId xmlns:p14="http://schemas.microsoft.com/office/powerpoint/2010/main" val="791719379"/>
+      </p:ext>
+    </p:extLst>
+  </p:cSld>
+  <p:clrMapOvr>
+    <a:masterClrMapping/>
+  </p:clrMapOvr>
+</p:sld>
+</file>
+
 <file path=ppt/theme/theme1.xml><?xml version="1.0" encoding="utf-8"?>
 <a:theme xmlns:a="http://schemas.openxmlformats.org/drawingml/2006/main" name="office theme">
   <a:themeElements>

</xml_diff>